<commit_message>
add shared workload optimization papers
</commit_message>
<xml_diff>
--- a/Hypercube.pptx
+++ b/Hypercube.pptx
@@ -3362,7 +3362,7 @@
           <a:p>
             <a:fld id="{36C54497-0AB4-6B48-8651-9BCE117B9331}" type="datetimeFigureOut">
               <a:rPr kumimoji="1" lang="zh-CN" altLang="en-US" smtClean="0"/>
-              <a:t>2020/12/4</a:t>
+              <a:t>2020/12/5</a:t>
             </a:fld>
             <a:endParaRPr kumimoji="1" lang="zh-CN" altLang="en-US"/>
           </a:p>
@@ -6305,6 +6305,34 @@
               </a:rPr>
               <a:t>集合</a:t>
             </a:r>
+            <a:endParaRPr kumimoji="1" lang="en-US" altLang="zh-CN" sz="1200" kern="1200" dirty="0">
+              <a:solidFill>
+                <a:schemeClr val="tx1"/>
+              </a:solidFill>
+              <a:effectLst/>
+              <a:latin typeface="+mn-lt"/>
+              <a:ea typeface="+mn-ea"/>
+              <a:cs typeface="+mn-cs"/>
+            </a:endParaRPr>
+          </a:p>
+          <a:p>
+            <a:pPr marL="0" marR="0" lvl="0" indent="0" algn="l" defTabSz="914400" rtl="0" eaLnBrk="1" fontAlgn="auto" latinLnBrk="0" hangingPunct="1">
+              <a:lnSpc>
+                <a:spcPct val="100000"/>
+              </a:lnSpc>
+              <a:spcBef>
+                <a:spcPts val="0"/>
+              </a:spcBef>
+              <a:spcAft>
+                <a:spcPts val="0"/>
+              </a:spcAft>
+              <a:buClrTx/>
+              <a:buSzTx/>
+              <a:buFontTx/>
+              <a:buNone/>
+              <a:tabLst/>
+              <a:defRPr/>
+            </a:pPr>
             <a:endParaRPr kumimoji="1" lang="en-US" altLang="zh-CN" dirty="0"/>
           </a:p>
           <a:p>
@@ -6620,7 +6648,7 @@
           <a:p>
             <a:fld id="{1A672227-9AE1-604A-9C86-A5AA5B738411}" type="datetimeFigureOut">
               <a:rPr kumimoji="1" lang="zh-CN" altLang="en-US" smtClean="0"/>
-              <a:t>2020/12/4</a:t>
+              <a:t>2020/12/5</a:t>
             </a:fld>
             <a:endParaRPr kumimoji="1" lang="zh-CN" altLang="en-US"/>
           </a:p>
@@ -6818,7 +6846,7 @@
           <a:p>
             <a:fld id="{1A672227-9AE1-604A-9C86-A5AA5B738411}" type="datetimeFigureOut">
               <a:rPr kumimoji="1" lang="zh-CN" altLang="en-US" smtClean="0"/>
-              <a:t>2020/12/4</a:t>
+              <a:t>2020/12/5</a:t>
             </a:fld>
             <a:endParaRPr kumimoji="1" lang="zh-CN" altLang="en-US"/>
           </a:p>
@@ -7026,7 +7054,7 @@
           <a:p>
             <a:fld id="{1A672227-9AE1-604A-9C86-A5AA5B738411}" type="datetimeFigureOut">
               <a:rPr kumimoji="1" lang="zh-CN" altLang="en-US" smtClean="0"/>
-              <a:t>2020/12/4</a:t>
+              <a:t>2020/12/5</a:t>
             </a:fld>
             <a:endParaRPr kumimoji="1" lang="zh-CN" altLang="en-US"/>
           </a:p>
@@ -7224,7 +7252,7 @@
           <a:p>
             <a:fld id="{1A672227-9AE1-604A-9C86-A5AA5B738411}" type="datetimeFigureOut">
               <a:rPr kumimoji="1" lang="zh-CN" altLang="en-US" smtClean="0"/>
-              <a:t>2020/12/4</a:t>
+              <a:t>2020/12/5</a:t>
             </a:fld>
             <a:endParaRPr kumimoji="1" lang="zh-CN" altLang="en-US"/>
           </a:p>
@@ -7499,7 +7527,7 @@
           <a:p>
             <a:fld id="{1A672227-9AE1-604A-9C86-A5AA5B738411}" type="datetimeFigureOut">
               <a:rPr kumimoji="1" lang="zh-CN" altLang="en-US" smtClean="0"/>
-              <a:t>2020/12/4</a:t>
+              <a:t>2020/12/5</a:t>
             </a:fld>
             <a:endParaRPr kumimoji="1" lang="zh-CN" altLang="en-US"/>
           </a:p>
@@ -7764,7 +7792,7 @@
           <a:p>
             <a:fld id="{1A672227-9AE1-604A-9C86-A5AA5B738411}" type="datetimeFigureOut">
               <a:rPr kumimoji="1" lang="zh-CN" altLang="en-US" smtClean="0"/>
-              <a:t>2020/12/4</a:t>
+              <a:t>2020/12/5</a:t>
             </a:fld>
             <a:endParaRPr kumimoji="1" lang="zh-CN" altLang="en-US"/>
           </a:p>
@@ -8176,7 +8204,7 @@
           <a:p>
             <a:fld id="{1A672227-9AE1-604A-9C86-A5AA5B738411}" type="datetimeFigureOut">
               <a:rPr kumimoji="1" lang="zh-CN" altLang="en-US" smtClean="0"/>
-              <a:t>2020/12/4</a:t>
+              <a:t>2020/12/5</a:t>
             </a:fld>
             <a:endParaRPr kumimoji="1" lang="zh-CN" altLang="en-US"/>
           </a:p>
@@ -8317,7 +8345,7 @@
           <a:p>
             <a:fld id="{1A672227-9AE1-604A-9C86-A5AA5B738411}" type="datetimeFigureOut">
               <a:rPr kumimoji="1" lang="zh-CN" altLang="en-US" smtClean="0"/>
-              <a:t>2020/12/4</a:t>
+              <a:t>2020/12/5</a:t>
             </a:fld>
             <a:endParaRPr kumimoji="1" lang="zh-CN" altLang="en-US"/>
           </a:p>
@@ -8430,7 +8458,7 @@
           <a:p>
             <a:fld id="{1A672227-9AE1-604A-9C86-A5AA5B738411}" type="datetimeFigureOut">
               <a:rPr kumimoji="1" lang="zh-CN" altLang="en-US" smtClean="0"/>
-              <a:t>2020/12/4</a:t>
+              <a:t>2020/12/5</a:t>
             </a:fld>
             <a:endParaRPr kumimoji="1" lang="zh-CN" altLang="en-US"/>
           </a:p>
@@ -8741,7 +8769,7 @@
           <a:p>
             <a:fld id="{1A672227-9AE1-604A-9C86-A5AA5B738411}" type="datetimeFigureOut">
               <a:rPr kumimoji="1" lang="zh-CN" altLang="en-US" smtClean="0"/>
-              <a:t>2020/12/4</a:t>
+              <a:t>2020/12/5</a:t>
             </a:fld>
             <a:endParaRPr kumimoji="1" lang="zh-CN" altLang="en-US"/>
           </a:p>
@@ -9029,7 +9057,7 @@
           <a:p>
             <a:fld id="{1A672227-9AE1-604A-9C86-A5AA5B738411}" type="datetimeFigureOut">
               <a:rPr kumimoji="1" lang="zh-CN" altLang="en-US" smtClean="0"/>
-              <a:t>2020/12/4</a:t>
+              <a:t>2020/12/5</a:t>
             </a:fld>
             <a:endParaRPr kumimoji="1" lang="zh-CN" altLang="en-US"/>
           </a:p>
@@ -9270,7 +9298,7 @@
           <a:p>
             <a:fld id="{1A672227-9AE1-604A-9C86-A5AA5B738411}" type="datetimeFigureOut">
               <a:rPr kumimoji="1" lang="zh-CN" altLang="en-US" smtClean="0"/>
-              <a:t>2020/12/4</a:t>
+              <a:t>2020/12/5</a:t>
             </a:fld>
             <a:endParaRPr kumimoji="1" lang="zh-CN" altLang="en-US"/>
           </a:p>

</xml_diff>